<commit_message>
Merged from Jennifer's branch
</commit_message>
<xml_diff>
--- a/Loan_Defaulter_PP.pptx
+++ b/Loan_Defaulter_PP.pptx
@@ -5,10 +5,10 @@
     <p:sldMasterId id="2147483648" r:id="rId4"/>
   </p:sldMasterIdLst>
   <p:notesMasterIdLst>
-    <p:notesMasterId r:id="rId19"/>
+    <p:notesMasterId r:id="rId18"/>
   </p:notesMasterIdLst>
   <p:handoutMasterIdLst>
-    <p:handoutMasterId r:id="rId20"/>
+    <p:handoutMasterId r:id="rId19"/>
   </p:handoutMasterIdLst>
   <p:sldIdLst>
     <p:sldId id="292" r:id="rId5"/>
@@ -20,11 +20,10 @@
     <p:sldId id="299" r:id="rId11"/>
     <p:sldId id="297" r:id="rId12"/>
     <p:sldId id="293" r:id="rId13"/>
-    <p:sldId id="300" r:id="rId14"/>
-    <p:sldId id="301" r:id="rId15"/>
-    <p:sldId id="288" r:id="rId16"/>
-    <p:sldId id="302" r:id="rId17"/>
-    <p:sldId id="289" r:id="rId18"/>
+    <p:sldId id="301" r:id="rId14"/>
+    <p:sldId id="288" r:id="rId15"/>
+    <p:sldId id="302" r:id="rId16"/>
+    <p:sldId id="289" r:id="rId17"/>
   </p:sldIdLst>
   <p:sldSz cx="12192000" cy="6858000"/>
   <p:notesSz cx="6858000" cy="9144000"/>
@@ -1462,7 +1461,7 @@
           <a:p>
             <a:fld id="{017105BD-6D6F-49DB-9DE4-D4A6452D7E5F}" type="slidenum">
               <a:rPr lang="en-US" altLang="zh-CN" noProof="0" smtClean="0"/>
-              <a:t>12</a:t>
+              <a:t>11</a:t>
             </a:fld>
             <a:endParaRPr lang="en-US" altLang="zh-CN" noProof="0" dirty="0"/>
           </a:p>
@@ -1570,7 +1569,7 @@
           <a:p>
             <a:fld id="{017105BD-6D6F-49DB-9DE4-D4A6452D7E5F}" type="slidenum">
               <a:rPr lang="en-US" altLang="zh-CN" noProof="0" smtClean="0"/>
-              <a:t>14</a:t>
+              <a:t>13</a:t>
             </a:fld>
             <a:endParaRPr lang="en-US" altLang="zh-CN" noProof="0" dirty="0"/>
           </a:p>
@@ -23465,8 +23464,8 @@
         </p:nvSpPr>
         <p:spPr>
           <a:xfrm>
-            <a:off x="651157" y="636766"/>
-            <a:ext cx="4718012" cy="2721895"/>
+            <a:off x="307731" y="636767"/>
+            <a:ext cx="5061438" cy="1482180"/>
           </a:xfrm>
         </p:spPr>
         <p:txBody>
@@ -23480,41 +23479,6 @@
           </a:p>
         </p:txBody>
       </p:sp>
-      <p:pic>
-        <p:nvPicPr>
-          <p:cNvPr id="19" name="Picture 18" descr="A blue squares with black text&#10;&#10;Description automatically generated">
-            <a:extLst>
-              <a:ext uri="{FF2B5EF4-FFF2-40B4-BE49-F238E27FC236}">
-                <a16:creationId xmlns:a16="http://schemas.microsoft.com/office/drawing/2014/main" id="{981C45CE-F3AA-C9FE-DC97-584DA27536FE}"/>
-              </a:ext>
-            </a:extLst>
-          </p:cNvPr>
-          <p:cNvPicPr>
-            <a:picLocks noChangeAspect="1"/>
-          </p:cNvPicPr>
-          <p:nvPr/>
-        </p:nvPicPr>
-        <p:blipFill>
-          <a:blip r:embed="rId2"/>
-          <a:stretch>
-            <a:fillRect/>
-          </a:stretch>
-        </p:blipFill>
-        <p:spPr>
-          <a:xfrm>
-            <a:off x="5710805" y="1700252"/>
-            <a:ext cx="5978530" cy="4427009"/>
-          </a:xfrm>
-          <a:prstGeom prst="rect">
-            <a:avLst/>
-          </a:prstGeom>
-          <a:ln w="76200">
-            <a:solidFill>
-              <a:srgbClr val="AEC2D8"/>
-            </a:solidFill>
-          </a:ln>
-        </p:spPr>
-      </p:pic>
       <p:sp>
         <p:nvSpPr>
           <p:cNvPr id="21" name="TextBox 20">
@@ -23529,8 +23493,8 @@
         </p:nvSpPr>
         <p:spPr>
           <a:xfrm>
-            <a:off x="2368732" y="2708365"/>
-            <a:ext cx="3342073" cy="2062103"/>
+            <a:off x="750804" y="2708365"/>
+            <a:ext cx="4718011" cy="1569660"/>
           </a:xfrm>
           <a:prstGeom prst="rect">
             <a:avLst/>
@@ -23560,7 +23524,7 @@
                 <a:effectLst/>
                 <a:latin typeface="Söhne"/>
               </a:rPr>
-              <a:t>The accuracy for that model was </a:t>
+              <a:t>The accuracy for Logistic Regression model was </a:t>
             </a:r>
             <a:br>
               <a:rPr lang="en-US" sz="1600" dirty="0">
@@ -23591,158 +23555,12 @@
           </a:p>
         </p:txBody>
       </p:sp>
-    </p:spTree>
-    <p:extLst>
-      <p:ext uri="{BB962C8B-B14F-4D97-AF65-F5344CB8AC3E}">
-        <p14:creationId xmlns:p14="http://schemas.microsoft.com/office/powerpoint/2010/main" val="2945493222"/>
-      </p:ext>
-    </p:extLst>
-  </p:cSld>
-  <p:clrMapOvr>
-    <a:masterClrMapping/>
-  </p:clrMapOvr>
-  <p:timing>
-    <p:tnLst>
-      <p:par>
-        <p:cTn id="1" dur="indefinite" restart="never" nodeType="tmRoot">
-          <p:childTnLst>
-            <p:seq concurrent="1" nextAc="seek">
-              <p:cTn id="2" dur="indefinite" nodeType="mainSeq">
-                <p:childTnLst>
-                  <p:par>
-                    <p:cTn id="3" fill="hold">
-                      <p:stCondLst>
-                        <p:cond delay="indefinite"/>
-                      </p:stCondLst>
-                      <p:childTnLst>
-                        <p:par>
-                          <p:cTn id="4" fill="hold">
-                            <p:stCondLst>
-                              <p:cond delay="0"/>
-                            </p:stCondLst>
-                            <p:childTnLst>
-                              <p:par>
-                                <p:cTn id="5" presetID="10" presetClass="entr" presetSubtype="0" fill="hold" nodeType="clickEffect">
-                                  <p:stCondLst>
-                                    <p:cond delay="0"/>
-                                  </p:stCondLst>
-                                  <p:childTnLst>
-                                    <p:set>
-                                      <p:cBhvr>
-                                        <p:cTn id="6" dur="1" fill="hold">
-                                          <p:stCondLst>
-                                            <p:cond delay="0"/>
-                                          </p:stCondLst>
-                                        </p:cTn>
-                                        <p:tgtEl>
-                                          <p:spTgt spid="19"/>
-                                        </p:tgtEl>
-                                        <p:attrNameLst>
-                                          <p:attrName>style.visibility</p:attrName>
-                                        </p:attrNameLst>
-                                      </p:cBhvr>
-                                      <p:to>
-                                        <p:strVal val="visible"/>
-                                      </p:to>
-                                    </p:set>
-                                    <p:animEffect transition="in" filter="fade">
-                                      <p:cBhvr>
-                                        <p:cTn id="7" dur="500"/>
-                                        <p:tgtEl>
-                                          <p:spTgt spid="19"/>
-                                        </p:tgtEl>
-                                      </p:cBhvr>
-                                    </p:animEffect>
-                                  </p:childTnLst>
-                                </p:cTn>
-                              </p:par>
-                            </p:childTnLst>
-                          </p:cTn>
-                        </p:par>
-                      </p:childTnLst>
-                    </p:cTn>
-                  </p:par>
-                </p:childTnLst>
-              </p:cTn>
-              <p:prevCondLst>
-                <p:cond evt="onPrev" delay="0">
-                  <p:tgtEl>
-                    <p:sldTgt/>
-                  </p:tgtEl>
-                </p:cond>
-              </p:prevCondLst>
-              <p:nextCondLst>
-                <p:cond evt="onNext" delay="0">
-                  <p:tgtEl>
-                    <p:sldTgt/>
-                  </p:tgtEl>
-                </p:cond>
-              </p:nextCondLst>
-            </p:seq>
-          </p:childTnLst>
-        </p:cTn>
-      </p:par>
-    </p:tnLst>
-  </p:timing>
-</p:sld>
-</file>
-
-<file path=ppt/slides/slide11.xml><?xml version="1.0" encoding="utf-8"?>
-<p:sld xmlns:a="http://schemas.openxmlformats.org/drawingml/2006/main" xmlns:r="http://schemas.openxmlformats.org/officeDocument/2006/relationships" xmlns:p="http://schemas.openxmlformats.org/presentationml/2006/main">
-  <p:cSld>
-    <p:spTree>
-      <p:nvGrpSpPr>
-        <p:cNvPr id="1" name=""/>
-        <p:cNvGrpSpPr/>
-        <p:nvPr/>
-      </p:nvGrpSpPr>
-      <p:grpSpPr>
-        <a:xfrm>
-          <a:off x="0" y="0"/>
-          <a:ext cx="0" cy="0"/>
-          <a:chOff x="0" y="0"/>
-          <a:chExt cx="0" cy="0"/>
-        </a:xfrm>
-      </p:grpSpPr>
-      <p:sp>
-        <p:nvSpPr>
-          <p:cNvPr id="8" name="Title 7">
-            <a:extLst>
-              <a:ext uri="{FF2B5EF4-FFF2-40B4-BE49-F238E27FC236}">
-                <a16:creationId xmlns:a16="http://schemas.microsoft.com/office/drawing/2014/main" id="{44B03DE5-5A80-0135-7317-AD2A6BBF8F7F}"/>
-              </a:ext>
-            </a:extLst>
-          </p:cNvPr>
-          <p:cNvSpPr>
-            <a:spLocks noGrp="1"/>
-          </p:cNvSpPr>
-          <p:nvPr>
-            <p:ph type="title"/>
-          </p:nvPr>
-        </p:nvSpPr>
-        <p:spPr>
-          <a:xfrm>
-            <a:off x="651157" y="636766"/>
-            <a:ext cx="4718012" cy="2721895"/>
-          </a:xfrm>
-        </p:spPr>
-        <p:txBody>
-          <a:bodyPr/>
-          <a:lstStyle/>
-          <a:p>
-            <a:r>
-              <a:rPr lang="en-US" dirty="0"/>
-              <a:t>Machine Learning: Models</a:t>
-            </a:r>
-          </a:p>
-        </p:txBody>
-      </p:sp>
       <p:pic>
         <p:nvPicPr>
-          <p:cNvPr id="19" name="Picture 18">
+          <p:cNvPr id="3" name="Picture 2">
             <a:extLst>
               <a:ext uri="{FF2B5EF4-FFF2-40B4-BE49-F238E27FC236}">
-                <a16:creationId xmlns:a16="http://schemas.microsoft.com/office/drawing/2014/main" id="{981C45CE-F3AA-C9FE-DC97-584DA27536FE}"/>
+                <a16:creationId xmlns:a16="http://schemas.microsoft.com/office/drawing/2014/main" id="{E2EA98E7-C219-CDF3-3422-7457C7D5B2F1}"/>
               </a:ext>
             </a:extLst>
           </p:cNvPr>
@@ -23753,100 +23571,20 @@
         </p:nvPicPr>
         <p:blipFill>
           <a:blip r:embed="rId2"/>
-          <a:srcRect/>
-          <a:stretch/>
+          <a:stretch>
+            <a:fillRect/>
+          </a:stretch>
         </p:blipFill>
         <p:spPr>
           <a:xfrm>
-            <a:off x="5710805" y="1700252"/>
-            <a:ext cx="5830038" cy="4610986"/>
-          </a:xfrm>
-          <a:prstGeom prst="rect">
-            <a:avLst/>
-          </a:prstGeom>
-          <a:ln w="76200">
-            <a:solidFill>
-              <a:srgbClr val="AEC2D8"/>
-            </a:solidFill>
-          </a:ln>
-        </p:spPr>
-      </p:pic>
-      <p:sp>
-        <p:nvSpPr>
-          <p:cNvPr id="21" name="TextBox 20">
-            <a:extLst>
-              <a:ext uri="{FF2B5EF4-FFF2-40B4-BE49-F238E27FC236}">
-                <a16:creationId xmlns:a16="http://schemas.microsoft.com/office/drawing/2014/main" id="{53A82E33-1BBF-3C04-F1E7-6C4A5F1C13E7}"/>
-              </a:ext>
-            </a:extLst>
-          </p:cNvPr>
-          <p:cNvSpPr txBox="1"/>
-          <p:nvPr/>
-        </p:nvSpPr>
-        <p:spPr>
-          <a:xfrm>
-            <a:off x="2368732" y="2708365"/>
-            <a:ext cx="3342073" cy="2062103"/>
+            <a:off x="5710805" y="1343025"/>
+            <a:ext cx="5934075" cy="4171950"/>
           </a:xfrm>
           <a:prstGeom prst="rect">
             <a:avLst/>
           </a:prstGeom>
         </p:spPr>
-        <p:txBody>
-          <a:bodyPr wrap="square" rtlCol="0">
-            <a:spAutoFit/>
-          </a:bodyPr>
-          <a:lstStyle/>
-          <a:p>
-            <a:pPr marL="0" indent="0">
-              <a:lnSpc>
-                <a:spcPct val="100000"/>
-              </a:lnSpc>
-              <a:spcBef>
-                <a:spcPts val="0"/>
-              </a:spcBef>
-              <a:buFontTx/>
-              <a:buNone/>
-            </a:pPr>
-            <a:r>
-              <a:rPr lang="en-US" sz="1600" b="0" i="0" dirty="0">
-                <a:solidFill>
-                  <a:schemeClr val="bg1"/>
-                </a:solidFill>
-                <a:effectLst/>
-                <a:latin typeface="Söhne"/>
-              </a:rPr>
-              <a:t>The accuracy for that model was </a:t>
-            </a:r>
-            <a:br>
-              <a:rPr lang="en-US" sz="1600" dirty="0">
-                <a:solidFill>
-                  <a:schemeClr val="bg1"/>
-                </a:solidFill>
-                <a:latin typeface="Söhne"/>
-              </a:rPr>
-            </a:br>
-            <a:r>
-              <a:rPr lang="en-US" sz="1600" b="0" i="0" dirty="0">
-                <a:solidFill>
-                  <a:schemeClr val="bg1"/>
-                </a:solidFill>
-                <a:effectLst/>
-                <a:latin typeface="Söhne"/>
-              </a:rPr>
-              <a:t>approximately 71.88%. As for the precision, it reached 71.93%, and the recall score was 99.57%. When we used the random forest model, its accuracy level reached 73.26%. The precision level reached 75.96%, and the recall level reached 91.65%</a:t>
-            </a:r>
-            <a:endParaRPr lang="en-US" sz="1600" dirty="0">
-              <a:solidFill>
-                <a:schemeClr val="bg1"/>
-              </a:solidFill>
-              <a:latin typeface="Söhne"/>
-              <a:ea typeface="微软雅黑"/>
-              <a:cs typeface="Posterama" panose="020B0504020200020000" pitchFamily="34" charset="0"/>
-            </a:endParaRPr>
-          </a:p>
-        </p:txBody>
-      </p:sp>
+      </p:pic>
     </p:spTree>
     <p:extLst>
       <p:ext uri="{BB962C8B-B14F-4D97-AF65-F5344CB8AC3E}">
@@ -23860,7 +23598,7 @@
 </p:sld>
 </file>
 
-<file path=ppt/slides/slide12.xml><?xml version="1.0" encoding="utf-8"?>
+<file path=ppt/slides/slide11.xml><?xml version="1.0" encoding="utf-8"?>
 <p:sld xmlns:a="http://schemas.openxmlformats.org/drawingml/2006/main" xmlns:r="http://schemas.openxmlformats.org/officeDocument/2006/relationships" xmlns:p="http://schemas.openxmlformats.org/presentationml/2006/main">
   <p:cSld>
     <p:spTree>
@@ -24471,7 +24209,7 @@
                 <a:tabLst/>
                 <a:defRPr/>
               </a:pPr>
-              <a:t>12</a:t>
+              <a:t>11</a:t>
             </a:fld>
             <a:endParaRPr kumimoji="0" lang="en-US" altLang="zh-CN" sz="1200" u="none" strike="noStrike" kern="1200" cap="none" spc="0" normalizeH="0" baseline="0" dirty="0">
               <a:ln>
@@ -24500,7 +24238,7 @@
 </p:sld>
 </file>
 
-<file path=ppt/slides/slide13.xml><?xml version="1.0" encoding="utf-8"?>
+<file path=ppt/slides/slide12.xml><?xml version="1.0" encoding="utf-8"?>
 <p:sld xmlns:a="http://schemas.openxmlformats.org/drawingml/2006/main" xmlns:r="http://schemas.openxmlformats.org/officeDocument/2006/relationships" xmlns:p="http://schemas.openxmlformats.org/presentationml/2006/main">
   <p:cSld>
     <p:bg>
@@ -24603,7 +24341,7 @@
 </p:sld>
 </file>
 
-<file path=ppt/slides/slide14.xml><?xml version="1.0" encoding="utf-8"?>
+<file path=ppt/slides/slide13.xml><?xml version="1.0" encoding="utf-8"?>
 <p:sld xmlns:a="http://schemas.openxmlformats.org/drawingml/2006/main" xmlns:r="http://schemas.openxmlformats.org/officeDocument/2006/relationships" xmlns:p="http://schemas.openxmlformats.org/presentationml/2006/main">
   <p:cSld>
     <p:spTree>

</xml_diff>